<commit_message>
added materials for pop gen in ML session
</commit_message>
<xml_diff>
--- a/popgen2021/Dan_Schrider/Schrider_IntroToML.pptx
+++ b/popgen2021/Dan_Schrider/Schrider_IntroToML.pptx
@@ -240,7 +240,7 @@
           <a:p>
             <a:fld id="{D45E7739-1BC1-BC48-BD86-98371FB2425D}" type="datetimeFigureOut">
               <a:rPr lang="en-US" smtClean="0"/>
-              <a:t>3/19/21</a:t>
+              <a:t>3/22/21</a:t>
             </a:fld>
             <a:endParaRPr lang="en-US"/>
           </a:p>
@@ -563,7 +563,7 @@
           </a:ln>
           <a:extLst>
             <a:ext uri="{909E8E84-426E-40dd-AFC4-6F175D3DCCD1}">
-              <a14:hiddenFill xmlns:a14="http://schemas.microsoft.com/office/drawing/2010/main" xmlns="">
+              <a14:hiddenFill xmlns="" xmlns:a14="http://schemas.microsoft.com/office/drawing/2010/main">
                 <a:solidFill>
                   <a:srgbClr val="FFFFFF"/>
                 </a:solidFill>
@@ -754,7 +754,7 @@
             <a:fld id="{1EF1F30A-7993-064C-95DE-DE163C6C4959}" type="datetimeFigureOut">
               <a:rPr lang="en-US" smtClean="0"/>
               <a:pPr/>
-              <a:t>3/19/21</a:t>
+              <a:t>3/22/21</a:t>
             </a:fld>
             <a:endParaRPr lang="en-US"/>
           </a:p>
@@ -937,7 +937,7 @@
           <a:p>
             <a:fld id="{1EF1F30A-7993-064C-95DE-DE163C6C4959}" type="datetimeFigureOut">
               <a:rPr lang="en-US" smtClean="0"/>
-              <a:t>3/19/21</a:t>
+              <a:t>3/22/21</a:t>
             </a:fld>
             <a:endParaRPr lang="en-US"/>
           </a:p>
@@ -1117,7 +1117,7 @@
           <a:p>
             <a:fld id="{1EF1F30A-7993-064C-95DE-DE163C6C4959}" type="datetimeFigureOut">
               <a:rPr lang="en-US" smtClean="0"/>
-              <a:t>3/19/21</a:t>
+              <a:t>3/22/21</a:t>
             </a:fld>
             <a:endParaRPr lang="en-US"/>
           </a:p>
@@ -1326,7 +1326,7 @@
             <a:fld id="{1EF1F30A-7993-064C-95DE-DE163C6C4959}" type="datetimeFigureOut">
               <a:rPr lang="en-US" smtClean="0"/>
               <a:pPr/>
-              <a:t>3/19/21</a:t>
+              <a:t>3/22/21</a:t>
             </a:fld>
             <a:endParaRPr lang="en-US"/>
           </a:p>
@@ -1593,7 +1593,7 @@
             <a:fld id="{1EF1F30A-7993-064C-95DE-DE163C6C4959}" type="datetimeFigureOut">
               <a:rPr lang="en-US" smtClean="0"/>
               <a:pPr/>
-              <a:t>3/19/21</a:t>
+              <a:t>3/22/21</a:t>
             </a:fld>
             <a:endParaRPr lang="en-US"/>
           </a:p>
@@ -1903,7 +1903,7 @@
             <a:fld id="{1EF1F30A-7993-064C-95DE-DE163C6C4959}" type="datetimeFigureOut">
               <a:rPr lang="en-US" smtClean="0"/>
               <a:pPr/>
-              <a:t>3/19/21</a:t>
+              <a:t>3/22/21</a:t>
             </a:fld>
             <a:endParaRPr lang="en-US" dirty="0"/>
           </a:p>
@@ -2283,7 +2283,7 @@
           <a:p>
             <a:fld id="{1EF1F30A-7993-064C-95DE-DE163C6C4959}" type="datetimeFigureOut">
               <a:rPr lang="en-US" smtClean="0"/>
-              <a:t>3/19/21</a:t>
+              <a:t>3/22/21</a:t>
             </a:fld>
             <a:endParaRPr lang="en-US" dirty="0"/>
           </a:p>
@@ -2401,7 +2401,7 @@
           <a:p>
             <a:fld id="{1EF1F30A-7993-064C-95DE-DE163C6C4959}" type="datetimeFigureOut">
               <a:rPr lang="en-US" smtClean="0"/>
-              <a:t>3/19/21</a:t>
+              <a:t>3/22/21</a:t>
             </a:fld>
             <a:endParaRPr lang="en-US" dirty="0"/>
           </a:p>
@@ -2496,7 +2496,7 @@
           <a:p>
             <a:fld id="{1EF1F30A-7993-064C-95DE-DE163C6C4959}" type="datetimeFigureOut">
               <a:rPr lang="en-US" smtClean="0"/>
-              <a:t>3/19/21</a:t>
+              <a:t>3/22/21</a:t>
             </a:fld>
             <a:endParaRPr lang="en-US"/>
           </a:p>
@@ -2773,7 +2773,7 @@
           <a:p>
             <a:fld id="{1EF1F30A-7993-064C-95DE-DE163C6C4959}" type="datetimeFigureOut">
               <a:rPr lang="en-US" smtClean="0"/>
-              <a:t>3/19/21</a:t>
+              <a:t>3/22/21</a:t>
             </a:fld>
             <a:endParaRPr lang="en-US"/>
           </a:p>
@@ -3030,7 +3030,7 @@
           <a:p>
             <a:fld id="{1EF1F30A-7993-064C-95DE-DE163C6C4959}" type="datetimeFigureOut">
               <a:rPr lang="en-US" smtClean="0"/>
-              <a:t>3/19/21</a:t>
+              <a:t>3/22/21</a:t>
             </a:fld>
             <a:endParaRPr lang="en-US"/>
           </a:p>
@@ -3245,7 +3245,7 @@
             <a:fld id="{1EF1F30A-7993-064C-95DE-DE163C6C4959}" type="datetimeFigureOut">
               <a:rPr lang="en-US" smtClean="0"/>
               <a:pPr/>
-              <a:t>3/19/21</a:t>
+              <a:t>3/22/21</a:t>
             </a:fld>
             <a:endParaRPr lang="en-US"/>
           </a:p>
@@ -7660,7 +7660,7 @@
           <a:noFill/>
           <a:extLst>
             <a:ext uri="{909E8E84-426E-40dd-AFC4-6F175D3DCCD1}">
-              <a14:hiddenFill xmlns:a14="http://schemas.microsoft.com/office/drawing/2010/main" xmlns="">
+              <a14:hiddenFill xmlns="" xmlns:a14="http://schemas.microsoft.com/office/drawing/2010/main">
                 <a:solidFill>
                   <a:srgbClr val="FFFFFF"/>
                 </a:solidFill>
@@ -7699,7 +7699,7 @@
           <a:noFill/>
           <a:extLst>
             <a:ext uri="{909E8E84-426E-40dd-AFC4-6F175D3DCCD1}">
-              <a14:hiddenFill xmlns:a14="http://schemas.microsoft.com/office/drawing/2010/main" xmlns="">
+              <a14:hiddenFill xmlns="" xmlns:a14="http://schemas.microsoft.com/office/drawing/2010/main">
                 <a:solidFill>
                   <a:srgbClr val="FFFFFF"/>
                 </a:solidFill>
@@ -7738,7 +7738,7 @@
           <a:noFill/>
           <a:extLst>
             <a:ext uri="{909E8E84-426E-40dd-AFC4-6F175D3DCCD1}">
-              <a14:hiddenFill xmlns:a14="http://schemas.microsoft.com/office/drawing/2010/main" xmlns="">
+              <a14:hiddenFill xmlns="" xmlns:a14="http://schemas.microsoft.com/office/drawing/2010/main">
                 <a:solidFill>
                   <a:srgbClr val="FFFFFF"/>
                 </a:solidFill>
@@ -7790,7 +7790,7 @@
           <a:noFill/>
           <a:extLst>
             <a:ext uri="{909E8E84-426E-40dd-AFC4-6F175D3DCCD1}">
-              <a14:hiddenFill xmlns:a14="http://schemas.microsoft.com/office/drawing/2010/main" xmlns="">
+              <a14:hiddenFill xmlns="" xmlns:a14="http://schemas.microsoft.com/office/drawing/2010/main">
                 <a:solidFill>
                   <a:srgbClr val="FFFFFF"/>
                 </a:solidFill>
@@ -11974,6 +11974,52 @@
             <a:r>
               <a:rPr lang="en-US" dirty="0"/>
               <a:t>Accuracy metrics: sensitivity, specificity, precision, recall, confusion matrices!</a:t>
+            </a:r>
+          </a:p>
+        </p:txBody>
+      </p:sp>
+      <p:sp>
+        <p:nvSpPr>
+          <p:cNvPr id="3" name="TextBox 2">
+            <a:extLst>
+              <a:ext uri="{FF2B5EF4-FFF2-40B4-BE49-F238E27FC236}">
+                <a16:creationId xmlns:a16="http://schemas.microsoft.com/office/drawing/2014/main" id="{CB2A161E-B6BC-F04E-9CA0-0A383075D272}"/>
+              </a:ext>
+            </a:extLst>
+          </p:cNvPr>
+          <p:cNvSpPr txBox="1"/>
+          <p:nvPr/>
+        </p:nvSpPr>
+        <p:spPr>
+          <a:xfrm>
+            <a:off x="0" y="6230679"/>
+            <a:ext cx="9144000" cy="461665"/>
+          </a:xfrm>
+          <a:prstGeom prst="rect">
+            <a:avLst/>
+          </a:prstGeom>
+          <a:noFill/>
+        </p:spPr>
+        <p:txBody>
+          <a:bodyPr wrap="square" rtlCol="0">
+            <a:spAutoFit/>
+          </a:bodyPr>
+          <a:lstStyle/>
+          <a:p>
+            <a:pPr algn="ctr"/>
+            <a:r>
+              <a:rPr lang="en-US" sz="2400" dirty="0"/>
+              <a:t>All through the magic of the </a:t>
+            </a:r>
+            <a:r>
+              <a:rPr lang="en-US" sz="2400" dirty="0">
+                <a:latin typeface="Courier" pitchFamily="2" charset="0"/>
+              </a:rPr>
+              <a:t>scikit-learn</a:t>
+            </a:r>
+            <a:r>
+              <a:rPr lang="en-US" sz="2400" dirty="0"/>
+              <a:t> python module</a:t>
             </a:r>
           </a:p>
         </p:txBody>

</xml_diff>